<commit_message>
Changed pictures to make them more visible
</commit_message>
<xml_diff>
--- a/journalSwarmControl/pictures/pdf/AllShapes.pptx
+++ b/journalSwarmControl/pictures/pdf/AllShapes.pptx
@@ -243,7 +243,7 @@
           <a:p>
             <a:fld id="{9EDA859D-9117-40BA-9C63-02B77D6B73EE}" type="datetimeFigureOut">
               <a:rPr lang="en-US" smtClean="0"/>
-              <a:t>8/10/2016</a:t>
+              <a:t>8/11/2016</a:t>
             </a:fld>
             <a:endParaRPr lang="en-US"/>
           </a:p>
@@ -413,7 +413,7 @@
           <a:p>
             <a:fld id="{9EDA859D-9117-40BA-9C63-02B77D6B73EE}" type="datetimeFigureOut">
               <a:rPr lang="en-US" smtClean="0"/>
-              <a:t>8/10/2016</a:t>
+              <a:t>8/11/2016</a:t>
             </a:fld>
             <a:endParaRPr lang="en-US"/>
           </a:p>
@@ -593,7 +593,7 @@
           <a:p>
             <a:fld id="{9EDA859D-9117-40BA-9C63-02B77D6B73EE}" type="datetimeFigureOut">
               <a:rPr lang="en-US" smtClean="0"/>
-              <a:t>8/10/2016</a:t>
+              <a:t>8/11/2016</a:t>
             </a:fld>
             <a:endParaRPr lang="en-US"/>
           </a:p>
@@ -763,7 +763,7 @@
           <a:p>
             <a:fld id="{9EDA859D-9117-40BA-9C63-02B77D6B73EE}" type="datetimeFigureOut">
               <a:rPr lang="en-US" smtClean="0"/>
-              <a:t>8/10/2016</a:t>
+              <a:t>8/11/2016</a:t>
             </a:fld>
             <a:endParaRPr lang="en-US"/>
           </a:p>
@@ -1007,7 +1007,7 @@
           <a:p>
             <a:fld id="{9EDA859D-9117-40BA-9C63-02B77D6B73EE}" type="datetimeFigureOut">
               <a:rPr lang="en-US" smtClean="0"/>
-              <a:t>8/10/2016</a:t>
+              <a:t>8/11/2016</a:t>
             </a:fld>
             <a:endParaRPr lang="en-US"/>
           </a:p>
@@ -1239,7 +1239,7 @@
           <a:p>
             <a:fld id="{9EDA859D-9117-40BA-9C63-02B77D6B73EE}" type="datetimeFigureOut">
               <a:rPr lang="en-US" smtClean="0"/>
-              <a:t>8/10/2016</a:t>
+              <a:t>8/11/2016</a:t>
             </a:fld>
             <a:endParaRPr lang="en-US"/>
           </a:p>
@@ -1606,7 +1606,7 @@
           <a:p>
             <a:fld id="{9EDA859D-9117-40BA-9C63-02B77D6B73EE}" type="datetimeFigureOut">
               <a:rPr lang="en-US" smtClean="0"/>
-              <a:t>8/10/2016</a:t>
+              <a:t>8/11/2016</a:t>
             </a:fld>
             <a:endParaRPr lang="en-US"/>
           </a:p>
@@ -1724,7 +1724,7 @@
           <a:p>
             <a:fld id="{9EDA859D-9117-40BA-9C63-02B77D6B73EE}" type="datetimeFigureOut">
               <a:rPr lang="en-US" smtClean="0"/>
-              <a:t>8/10/2016</a:t>
+              <a:t>8/11/2016</a:t>
             </a:fld>
             <a:endParaRPr lang="en-US"/>
           </a:p>
@@ -1819,7 +1819,7 @@
           <a:p>
             <a:fld id="{9EDA859D-9117-40BA-9C63-02B77D6B73EE}" type="datetimeFigureOut">
               <a:rPr lang="en-US" smtClean="0"/>
-              <a:t>8/10/2016</a:t>
+              <a:t>8/11/2016</a:t>
             </a:fld>
             <a:endParaRPr lang="en-US"/>
           </a:p>
@@ -2096,7 +2096,7 @@
           <a:p>
             <a:fld id="{9EDA859D-9117-40BA-9C63-02B77D6B73EE}" type="datetimeFigureOut">
               <a:rPr lang="en-US" smtClean="0"/>
-              <a:t>8/10/2016</a:t>
+              <a:t>8/11/2016</a:t>
             </a:fld>
             <a:endParaRPr lang="en-US"/>
           </a:p>
@@ -2353,7 +2353,7 @@
           <a:p>
             <a:fld id="{9EDA859D-9117-40BA-9C63-02B77D6B73EE}" type="datetimeFigureOut">
               <a:rPr lang="en-US" smtClean="0"/>
-              <a:t>8/10/2016</a:t>
+              <a:t>8/11/2016</a:t>
             </a:fld>
             <a:endParaRPr lang="en-US"/>
           </a:p>
@@ -2566,7 +2566,7 @@
           <a:p>
             <a:fld id="{9EDA859D-9117-40BA-9C63-02B77D6B73EE}" type="datetimeFigureOut">
               <a:rPr lang="en-US" smtClean="0"/>
-              <a:t>8/10/2016</a:t>
+              <a:t>8/11/2016</a:t>
             </a:fld>
             <a:endParaRPr lang="en-US"/>
           </a:p>
@@ -2973,7 +2973,7 @@
       </p:grpSpPr>
       <p:pic>
         <p:nvPicPr>
-          <p:cNvPr id="3" name="Picture 2"/>
+          <p:cNvPr id="2" name="Picture 1"/>
           <p:cNvPicPr>
             <a:picLocks noChangeAspect="1"/>
           </p:cNvPicPr>
@@ -2987,8 +2987,8 @@
         </p:blipFill>
         <p:spPr>
           <a:xfrm>
-            <a:off x="0" y="1"/>
-            <a:ext cx="6880962" cy="6858000"/>
+            <a:off x="-1" y="0"/>
+            <a:ext cx="6903873" cy="6858000"/>
           </a:xfrm>
           <a:prstGeom prst="rect">
             <a:avLst/>

</xml_diff>